<commit_message>
The slippery site and stop codons are colored on the RNAfold structures
</commit_message>
<xml_diff>
--- a/images/rnafold.pptx
+++ b/images/rnafold.pptx
@@ -304,7 +304,7 @@
           <a:p>
             <a:fld id="{01197F44-DB72-474A-9754-31703E05C006}" type="datetimeFigureOut">
               <a:rPr lang="en-US" smtClean="0"/>
-              <a:t>6/18/19</a:t>
+              <a:t>6/24/19</a:t>
             </a:fld>
             <a:endParaRPr lang="en-US"/>
           </a:p>
@@ -474,7 +474,7 @@
           <a:p>
             <a:fld id="{01197F44-DB72-474A-9754-31703E05C006}" type="datetimeFigureOut">
               <a:rPr lang="en-US" smtClean="0"/>
-              <a:t>6/18/19</a:t>
+              <a:t>6/24/19</a:t>
             </a:fld>
             <a:endParaRPr lang="en-US"/>
           </a:p>
@@ -654,7 +654,7 @@
           <a:p>
             <a:fld id="{01197F44-DB72-474A-9754-31703E05C006}" type="datetimeFigureOut">
               <a:rPr lang="en-US" smtClean="0"/>
-              <a:t>6/18/19</a:t>
+              <a:t>6/24/19</a:t>
             </a:fld>
             <a:endParaRPr lang="en-US"/>
           </a:p>
@@ -824,7 +824,7 @@
           <a:p>
             <a:fld id="{01197F44-DB72-474A-9754-31703E05C006}" type="datetimeFigureOut">
               <a:rPr lang="en-US" smtClean="0"/>
-              <a:t>6/18/19</a:t>
+              <a:t>6/24/19</a:t>
             </a:fld>
             <a:endParaRPr lang="en-US"/>
           </a:p>
@@ -1070,7 +1070,7 @@
           <a:p>
             <a:fld id="{01197F44-DB72-474A-9754-31703E05C006}" type="datetimeFigureOut">
               <a:rPr lang="en-US" smtClean="0"/>
-              <a:t>6/18/19</a:t>
+              <a:t>6/24/19</a:t>
             </a:fld>
             <a:endParaRPr lang="en-US"/>
           </a:p>
@@ -1358,7 +1358,7 @@
           <a:p>
             <a:fld id="{01197F44-DB72-474A-9754-31703E05C006}" type="datetimeFigureOut">
               <a:rPr lang="en-US" smtClean="0"/>
-              <a:t>6/18/19</a:t>
+              <a:t>6/24/19</a:t>
             </a:fld>
             <a:endParaRPr lang="en-US"/>
           </a:p>
@@ -1780,7 +1780,7 @@
           <a:p>
             <a:fld id="{01197F44-DB72-474A-9754-31703E05C006}" type="datetimeFigureOut">
               <a:rPr lang="en-US" smtClean="0"/>
-              <a:t>6/18/19</a:t>
+              <a:t>6/24/19</a:t>
             </a:fld>
             <a:endParaRPr lang="en-US"/>
           </a:p>
@@ -1898,7 +1898,7 @@
           <a:p>
             <a:fld id="{01197F44-DB72-474A-9754-31703E05C006}" type="datetimeFigureOut">
               <a:rPr lang="en-US" smtClean="0"/>
-              <a:t>6/18/19</a:t>
+              <a:t>6/24/19</a:t>
             </a:fld>
             <a:endParaRPr lang="en-US"/>
           </a:p>
@@ -1993,7 +1993,7 @@
           <a:p>
             <a:fld id="{01197F44-DB72-474A-9754-31703E05C006}" type="datetimeFigureOut">
               <a:rPr lang="en-US" smtClean="0"/>
-              <a:t>6/18/19</a:t>
+              <a:t>6/24/19</a:t>
             </a:fld>
             <a:endParaRPr lang="en-US"/>
           </a:p>
@@ -2270,7 +2270,7 @@
           <a:p>
             <a:fld id="{01197F44-DB72-474A-9754-31703E05C006}" type="datetimeFigureOut">
               <a:rPr lang="en-US" smtClean="0"/>
-              <a:t>6/18/19</a:t>
+              <a:t>6/24/19</a:t>
             </a:fld>
             <a:endParaRPr lang="en-US"/>
           </a:p>
@@ -2523,7 +2523,7 @@
           <a:p>
             <a:fld id="{01197F44-DB72-474A-9754-31703E05C006}" type="datetimeFigureOut">
               <a:rPr lang="en-US" smtClean="0"/>
-              <a:t>6/18/19</a:t>
+              <a:t>6/24/19</a:t>
             </a:fld>
             <a:endParaRPr lang="en-US"/>
           </a:p>
@@ -2736,7 +2736,7 @@
           <a:p>
             <a:fld id="{01197F44-DB72-474A-9754-31703E05C006}" type="datetimeFigureOut">
               <a:rPr lang="en-US" smtClean="0"/>
-              <a:t>6/18/19</a:t>
+              <a:t>6/24/19</a:t>
             </a:fld>
             <a:endParaRPr lang="en-US"/>
           </a:p>
@@ -3111,213 +3111,9 @@
           <a:chExt cx="0" cy="0"/>
         </a:xfrm>
       </p:grpSpPr>
-      <p:sp>
-        <p:nvSpPr>
-          <p:cNvPr id="62" name="Rectangle 61"/>
-          <p:cNvSpPr/>
-          <p:nvPr/>
-        </p:nvSpPr>
-        <p:spPr>
-          <a:xfrm>
-            <a:off x="60128" y="2949893"/>
-            <a:ext cx="3352800" cy="338554"/>
-          </a:xfrm>
-          <a:prstGeom prst="rect">
-            <a:avLst/>
-          </a:prstGeom>
-        </p:spPr>
-        <p:txBody>
-          <a:bodyPr wrap="square">
-            <a:spAutoFit/>
-          </a:bodyPr>
-          <a:lstStyle/>
-          <a:p>
-            <a:pPr algn="ctr"/>
-            <a:r>
-              <a:rPr lang="en-US" sz="1600" i="1" dirty="0" err="1"/>
-              <a:t>Methanocaldococcus</a:t>
-            </a:r>
-            <a:r>
-              <a:rPr lang="en-US" sz="1600" i="1" dirty="0"/>
-              <a:t> </a:t>
-            </a:r>
-            <a:r>
-              <a:rPr lang="en-US" sz="1600" i="1" dirty="0" err="1"/>
-              <a:t>fervens</a:t>
-            </a:r>
-            <a:r>
-              <a:rPr lang="en-US" sz="1600" i="1" dirty="0"/>
-              <a:t> AG86</a:t>
-            </a:r>
-          </a:p>
-        </p:txBody>
-      </p:sp>
-      <p:sp>
-        <p:nvSpPr>
-          <p:cNvPr id="65" name="Rectangle 64"/>
-          <p:cNvSpPr/>
-          <p:nvPr/>
-        </p:nvSpPr>
-        <p:spPr>
-          <a:xfrm>
-            <a:off x="153262" y="76201"/>
-            <a:ext cx="210804" cy="461665"/>
-          </a:xfrm>
-          <a:prstGeom prst="rect">
-            <a:avLst/>
-          </a:prstGeom>
-        </p:spPr>
-        <p:txBody>
-          <a:bodyPr wrap="square">
-            <a:spAutoFit/>
-          </a:bodyPr>
-          <a:lstStyle/>
-          <a:p>
-            <a:pPr algn="ctr"/>
-            <a:r>
-              <a:rPr lang="en-US" sz="2400" b="1" dirty="0" smtClean="0"/>
-              <a:t>A</a:t>
-            </a:r>
-            <a:endParaRPr lang="en-US" sz="2400" b="1" dirty="0"/>
-          </a:p>
-        </p:txBody>
-      </p:sp>
-      <p:sp>
-        <p:nvSpPr>
-          <p:cNvPr id="67" name="Rectangle 66"/>
-          <p:cNvSpPr/>
-          <p:nvPr/>
-        </p:nvSpPr>
-        <p:spPr>
-          <a:xfrm>
-            <a:off x="3566190" y="76201"/>
-            <a:ext cx="210804" cy="461665"/>
-          </a:xfrm>
-          <a:prstGeom prst="rect">
-            <a:avLst/>
-          </a:prstGeom>
-        </p:spPr>
-        <p:txBody>
-          <a:bodyPr wrap="square">
-            <a:spAutoFit/>
-          </a:bodyPr>
-          <a:lstStyle/>
-          <a:p>
-            <a:pPr algn="ctr"/>
-            <a:r>
-              <a:rPr lang="en-US" sz="2400" b="1" dirty="0"/>
-              <a:t>B</a:t>
-            </a:r>
-          </a:p>
-        </p:txBody>
-      </p:sp>
-      <p:sp>
-        <p:nvSpPr>
-          <p:cNvPr id="68" name="Rectangle 67"/>
-          <p:cNvSpPr/>
-          <p:nvPr/>
-        </p:nvSpPr>
-        <p:spPr>
-          <a:xfrm>
-            <a:off x="4282541" y="2949893"/>
-            <a:ext cx="3352800" cy="338554"/>
-          </a:xfrm>
-          <a:prstGeom prst="rect">
-            <a:avLst/>
-          </a:prstGeom>
-        </p:spPr>
-        <p:txBody>
-          <a:bodyPr wrap="square">
-            <a:spAutoFit/>
-          </a:bodyPr>
-          <a:lstStyle/>
-          <a:p>
-            <a:pPr algn="ctr"/>
-            <a:r>
-              <a:rPr lang="en-US" sz="1600" i="1" dirty="0" err="1"/>
-              <a:t>Methanocaldococcus</a:t>
-            </a:r>
-            <a:r>
-              <a:rPr lang="en-US" sz="1600" i="1" dirty="0"/>
-              <a:t> sp. FS406-22</a:t>
-            </a:r>
-          </a:p>
-        </p:txBody>
-      </p:sp>
-      <p:sp>
-        <p:nvSpPr>
-          <p:cNvPr id="70" name="Rectangle 69"/>
-          <p:cNvSpPr/>
-          <p:nvPr/>
-        </p:nvSpPr>
-        <p:spPr>
-          <a:xfrm>
-            <a:off x="153262" y="4005509"/>
-            <a:ext cx="210804" cy="461665"/>
-          </a:xfrm>
-          <a:prstGeom prst="rect">
-            <a:avLst/>
-          </a:prstGeom>
-        </p:spPr>
-        <p:txBody>
-          <a:bodyPr wrap="square">
-            <a:spAutoFit/>
-          </a:bodyPr>
-          <a:lstStyle/>
-          <a:p>
-            <a:pPr algn="ctr"/>
-            <a:r>
-              <a:rPr lang="en-US" sz="2400" b="1" dirty="0" smtClean="0"/>
-              <a:t>C</a:t>
-            </a:r>
-            <a:endParaRPr lang="en-US" sz="2400" b="1" dirty="0"/>
-          </a:p>
-        </p:txBody>
-      </p:sp>
-      <p:sp>
-        <p:nvSpPr>
-          <p:cNvPr id="71" name="Rectangle 70"/>
-          <p:cNvSpPr/>
-          <p:nvPr/>
-        </p:nvSpPr>
-        <p:spPr>
-          <a:xfrm>
-            <a:off x="2503291" y="6879199"/>
-            <a:ext cx="3352800" cy="338554"/>
-          </a:xfrm>
-          <a:prstGeom prst="rect">
-            <a:avLst/>
-          </a:prstGeom>
-        </p:spPr>
-        <p:txBody>
-          <a:bodyPr wrap="square">
-            <a:spAutoFit/>
-          </a:bodyPr>
-          <a:lstStyle/>
-          <a:p>
-            <a:pPr algn="ctr"/>
-            <a:r>
-              <a:rPr lang="en-US" sz="1600" i="1" dirty="0" err="1"/>
-              <a:t>Delftia</a:t>
-            </a:r>
-            <a:r>
-              <a:rPr lang="en-US" sz="1600" i="1" dirty="0"/>
-              <a:t> </a:t>
-            </a:r>
-            <a:r>
-              <a:rPr lang="en-US" sz="1600" i="1" dirty="0" err="1"/>
-              <a:t>acidovorans</a:t>
-            </a:r>
-            <a:r>
-              <a:rPr lang="en-US" sz="1600" i="1" dirty="0"/>
-              <a:t> SPH-1</a:t>
-            </a:r>
-          </a:p>
-        </p:txBody>
-      </p:sp>
       <p:pic>
         <p:nvPicPr>
-          <p:cNvPr id="2" name="Picture 1"/>
+          <p:cNvPr id="7" name="Picture 6"/>
           <p:cNvPicPr>
             <a:picLocks noChangeAspect="1"/>
           </p:cNvPicPr>
@@ -3337,17 +3133,299 @@
         </p:blipFill>
         <p:spPr>
           <a:xfrm>
-            <a:off x="30654" y="-32373"/>
-            <a:ext cx="3086441" cy="2987675"/>
+            <a:off x="0" y="3675888"/>
+            <a:ext cx="8229600" cy="4553712"/>
           </a:xfrm>
           <a:prstGeom prst="rect">
             <a:avLst/>
           </a:prstGeom>
         </p:spPr>
       </p:pic>
+      <p:sp>
+        <p:nvSpPr>
+          <p:cNvPr id="62" name="Rectangle 61"/>
+          <p:cNvSpPr/>
+          <p:nvPr/>
+        </p:nvSpPr>
+        <p:spPr>
+          <a:xfrm>
+            <a:off x="60128" y="2949893"/>
+            <a:ext cx="3352800" cy="584775"/>
+          </a:xfrm>
+          <a:prstGeom prst="rect">
+            <a:avLst/>
+          </a:prstGeom>
+        </p:spPr>
+        <p:txBody>
+          <a:bodyPr wrap="square">
+            <a:spAutoFit/>
+          </a:bodyPr>
+          <a:lstStyle/>
+          <a:p>
+            <a:pPr algn="ctr"/>
+            <a:r>
+              <a:rPr lang="en-US" sz="1600" i="1" dirty="0" err="1"/>
+              <a:t>Methanocaldococcus</a:t>
+            </a:r>
+            <a:r>
+              <a:rPr lang="en-US" sz="1600" i="1" dirty="0"/>
+              <a:t> </a:t>
+            </a:r>
+            <a:r>
+              <a:rPr lang="en-US" sz="1600" i="1" dirty="0" err="1"/>
+              <a:t>fervens</a:t>
+            </a:r>
+            <a:r>
+              <a:rPr lang="en-US" sz="1600" i="1" dirty="0"/>
+              <a:t> </a:t>
+            </a:r>
+            <a:r>
+              <a:rPr lang="en-US" sz="1600" i="1" dirty="0" smtClean="0"/>
+              <a:t>AG86</a:t>
+            </a:r>
+          </a:p>
+          <a:p>
+            <a:pPr algn="ctr"/>
+            <a:r>
+              <a:rPr lang="cs-CZ" sz="1600" dirty="0">
+                <a:cs typeface="Courier New"/>
+              </a:rPr>
+              <a:t>NC_013156.1:</a:t>
+            </a:r>
+            <a:r>
+              <a:rPr lang="is-IS" sz="1600" dirty="0">
+                <a:cs typeface="Courier New"/>
+              </a:rPr>
+              <a:t>1122916</a:t>
+            </a:r>
+            <a:r>
+              <a:rPr lang="cs-CZ" sz="1600" dirty="0">
+                <a:cs typeface="Courier New"/>
+              </a:rPr>
+              <a:t>-</a:t>
+            </a:r>
+            <a:r>
+              <a:rPr lang="is-IS" sz="1600" dirty="0">
+                <a:cs typeface="Courier New"/>
+              </a:rPr>
+              <a:t>1122992</a:t>
+            </a:r>
+            <a:r>
+              <a:rPr lang="cs-CZ" sz="1600" dirty="0">
+                <a:cs typeface="Courier New"/>
+              </a:rPr>
+              <a:t>(+)</a:t>
+            </a:r>
+            <a:endParaRPr lang="en-US" sz="1600" i="1" dirty="0"/>
+          </a:p>
+        </p:txBody>
+      </p:sp>
+      <p:sp>
+        <p:nvSpPr>
+          <p:cNvPr id="65" name="Rectangle 64"/>
+          <p:cNvSpPr/>
+          <p:nvPr/>
+        </p:nvSpPr>
+        <p:spPr>
+          <a:xfrm>
+            <a:off x="153262" y="76201"/>
+            <a:ext cx="210804" cy="461665"/>
+          </a:xfrm>
+          <a:prstGeom prst="rect">
+            <a:avLst/>
+          </a:prstGeom>
+        </p:spPr>
+        <p:txBody>
+          <a:bodyPr wrap="square">
+            <a:spAutoFit/>
+          </a:bodyPr>
+          <a:lstStyle/>
+          <a:p>
+            <a:pPr algn="ctr"/>
+            <a:r>
+              <a:rPr lang="en-US" sz="2400" b="1" dirty="0" smtClean="0"/>
+              <a:t>A</a:t>
+            </a:r>
+            <a:endParaRPr lang="en-US" sz="2400" b="1" dirty="0"/>
+          </a:p>
+        </p:txBody>
+      </p:sp>
+      <p:sp>
+        <p:nvSpPr>
+          <p:cNvPr id="67" name="Rectangle 66"/>
+          <p:cNvSpPr/>
+          <p:nvPr/>
+        </p:nvSpPr>
+        <p:spPr>
+          <a:xfrm>
+            <a:off x="3566190" y="76201"/>
+            <a:ext cx="210804" cy="461665"/>
+          </a:xfrm>
+          <a:prstGeom prst="rect">
+            <a:avLst/>
+          </a:prstGeom>
+        </p:spPr>
+        <p:txBody>
+          <a:bodyPr wrap="square">
+            <a:spAutoFit/>
+          </a:bodyPr>
+          <a:lstStyle/>
+          <a:p>
+            <a:pPr algn="ctr"/>
+            <a:r>
+              <a:rPr lang="en-US" sz="2400" b="1" dirty="0"/>
+              <a:t>B</a:t>
+            </a:r>
+          </a:p>
+        </p:txBody>
+      </p:sp>
+      <p:sp>
+        <p:nvSpPr>
+          <p:cNvPr id="68" name="Rectangle 67"/>
+          <p:cNvSpPr/>
+          <p:nvPr/>
+        </p:nvSpPr>
+        <p:spPr>
+          <a:xfrm>
+            <a:off x="4282541" y="2949893"/>
+            <a:ext cx="3352800" cy="584775"/>
+          </a:xfrm>
+          <a:prstGeom prst="rect">
+            <a:avLst/>
+          </a:prstGeom>
+        </p:spPr>
+        <p:txBody>
+          <a:bodyPr wrap="square">
+            <a:spAutoFit/>
+          </a:bodyPr>
+          <a:lstStyle/>
+          <a:p>
+            <a:pPr algn="ctr"/>
+            <a:r>
+              <a:rPr lang="en-US" sz="1600" i="1" dirty="0" err="1"/>
+              <a:t>Methanocaldococcus</a:t>
+            </a:r>
+            <a:r>
+              <a:rPr lang="en-US" sz="1600" i="1" dirty="0"/>
+              <a:t> sp. </a:t>
+            </a:r>
+            <a:r>
+              <a:rPr lang="en-US" sz="1600" i="1" dirty="0" smtClean="0"/>
+              <a:t>FS406-22</a:t>
+            </a:r>
+          </a:p>
+          <a:p>
+            <a:pPr algn="ctr"/>
+            <a:r>
+              <a:rPr lang="is-IS" sz="1600" dirty="0"/>
+              <a:t>NC_013887.1:1224237-1224313(+)</a:t>
+            </a:r>
+            <a:endParaRPr lang="en-US" sz="1600" i="1" dirty="0"/>
+          </a:p>
+        </p:txBody>
+      </p:sp>
+      <p:sp>
+        <p:nvSpPr>
+          <p:cNvPr id="70" name="Rectangle 69"/>
+          <p:cNvSpPr/>
+          <p:nvPr/>
+        </p:nvSpPr>
+        <p:spPr>
+          <a:xfrm>
+            <a:off x="153262" y="4005509"/>
+            <a:ext cx="210804" cy="461665"/>
+          </a:xfrm>
+          <a:prstGeom prst="rect">
+            <a:avLst/>
+          </a:prstGeom>
+        </p:spPr>
+        <p:txBody>
+          <a:bodyPr wrap="square">
+            <a:spAutoFit/>
+          </a:bodyPr>
+          <a:lstStyle/>
+          <a:p>
+            <a:pPr algn="ctr"/>
+            <a:r>
+              <a:rPr lang="en-US" sz="2400" b="1" dirty="0" smtClean="0"/>
+              <a:t>C</a:t>
+            </a:r>
+            <a:endParaRPr lang="en-US" sz="2400" b="1" dirty="0"/>
+          </a:p>
+        </p:txBody>
+      </p:sp>
+      <p:sp>
+        <p:nvSpPr>
+          <p:cNvPr id="71" name="Rectangle 70"/>
+          <p:cNvSpPr/>
+          <p:nvPr/>
+        </p:nvSpPr>
+        <p:spPr>
+          <a:xfrm>
+            <a:off x="2503291" y="6879199"/>
+            <a:ext cx="3352800" cy="584775"/>
+          </a:xfrm>
+          <a:prstGeom prst="rect">
+            <a:avLst/>
+          </a:prstGeom>
+        </p:spPr>
+        <p:txBody>
+          <a:bodyPr wrap="square">
+            <a:spAutoFit/>
+          </a:bodyPr>
+          <a:lstStyle/>
+          <a:p>
+            <a:pPr algn="ctr"/>
+            <a:r>
+              <a:rPr lang="en-US" sz="1600" i="1" dirty="0" err="1"/>
+              <a:t>Delftia</a:t>
+            </a:r>
+            <a:r>
+              <a:rPr lang="en-US" sz="1600" i="1" dirty="0"/>
+              <a:t> </a:t>
+            </a:r>
+            <a:r>
+              <a:rPr lang="en-US" sz="1600" i="1" dirty="0" err="1"/>
+              <a:t>acidovorans</a:t>
+            </a:r>
+            <a:r>
+              <a:rPr lang="en-US" sz="1600" i="1" dirty="0"/>
+              <a:t> </a:t>
+            </a:r>
+            <a:r>
+              <a:rPr lang="en-US" sz="1600" i="1" dirty="0" smtClean="0"/>
+              <a:t>SPH-1</a:t>
+            </a:r>
+          </a:p>
+          <a:p>
+            <a:pPr algn="ctr"/>
+            <a:r>
+              <a:rPr lang="en-US" sz="1600" dirty="0"/>
+              <a:t>NC_010002.1:</a:t>
+            </a:r>
+            <a:r>
+              <a:rPr lang="is-IS" sz="1600" dirty="0"/>
+              <a:t>6395640</a:t>
+            </a:r>
+            <a:r>
+              <a:rPr lang="en-US" sz="1600" dirty="0"/>
+              <a:t>-</a:t>
+            </a:r>
+            <a:r>
+              <a:rPr lang="is-IS" sz="1600" dirty="0"/>
+              <a:t>6395711</a:t>
+            </a:r>
+            <a:r>
+              <a:rPr lang="en-US" sz="1600"/>
+              <a:t>(-)</a:t>
+            </a:r>
+            <a:endParaRPr lang="en-US" sz="1600" i="1" dirty="0"/>
+          </a:p>
+        </p:txBody>
+      </p:sp>
       <p:pic>
         <p:nvPicPr>
-          <p:cNvPr id="3" name="Picture 2"/>
+          <p:cNvPr id="5" name="Picture 4"/>
           <p:cNvPicPr>
             <a:picLocks noChangeAspect="1"/>
           </p:cNvPicPr>
@@ -3367,8 +3445,8 @@
         </p:blipFill>
         <p:spPr>
           <a:xfrm>
-            <a:off x="3651693" y="-32373"/>
-            <a:ext cx="4539218" cy="2982266"/>
+            <a:off x="172046" y="25519"/>
+            <a:ext cx="3128963" cy="2975991"/>
           </a:xfrm>
           <a:prstGeom prst="rect">
             <a:avLst/>
@@ -3377,7 +3455,7 @@
       </p:pic>
       <p:pic>
         <p:nvPicPr>
-          <p:cNvPr id="4" name="Picture 3"/>
+          <p:cNvPr id="6" name="Picture 5"/>
           <p:cNvPicPr>
             <a:picLocks noChangeAspect="1"/>
           </p:cNvPicPr>
@@ -3397,8 +3475,8 @@
         </p:blipFill>
         <p:spPr>
           <a:xfrm>
-            <a:off x="64891" y="3638399"/>
-            <a:ext cx="8126020" cy="4591201"/>
+            <a:off x="3647008" y="21599"/>
+            <a:ext cx="4543903" cy="2928293"/>
           </a:xfrm>
           <a:prstGeom prst="rect">
             <a:avLst/>

</xml_diff>